<commit_message>
All tested games parsing successfully! Improved readme.md! Cleanup Drastically reduce runtime with optimized transpiler version.
</commit_message>
<xml_diff>
--- a/process.pptx
+++ b/process.pptx
@@ -104,6 +104,11 @@
       </a:defRPr>
     </a:lvl9pPr>
   </p:defaultTextStyle>
+  <p:extLst>
+    <p:ext uri="{EFAFB233-063F-42B5-8137-9DF3F51BA10A}">
+      <p15:sldGuideLst xmlns:p15="http://schemas.microsoft.com/office/powerpoint/2012/main"/>
+    </p:ext>
+  </p:extLst>
 </p:presentation>
 </file>
 
@@ -1098,7 +1103,7 @@
         <a:p>
           <a:r>
             <a:rPr lang="de-DE" dirty="0"/>
-            <a:t>regex.txt</a:t>
+            <a:t>Regex.txt</a:t>
           </a:r>
         </a:p>
       </dgm:t>
@@ -1134,7 +1139,23 @@
         <a:p>
           <a:r>
             <a:rPr lang="de-DE" dirty="0" err="1"/>
-            <a:t>yacc.ctpl</a:t>
+            <a:t>Yacc</a:t>
+          </a:r>
+          <a:r>
+            <a:rPr lang="de-DE" dirty="0"/>
+            <a:t>(_</a:t>
+          </a:r>
+          <a:r>
+            <a:rPr lang="de-DE" dirty="0" err="1"/>
+            <a:t>opt</a:t>
+          </a:r>
+          <a:r>
+            <a:rPr lang="de-DE" dirty="0"/>
+            <a:t>).</a:t>
+          </a:r>
+          <a:r>
+            <a:rPr lang="de-DE" dirty="0" err="1"/>
+            <a:t>ctpl</a:t>
           </a:r>
           <a:endParaRPr lang="de-DE" dirty="0"/>
         </a:p>
@@ -1152,6 +1173,50 @@
       </dgm:t>
     </dgm:pt>
     <dgm:pt modelId="{4B96F205-D88C-4FA4-8D6F-0E6302DE93C5}" type="sibTrans" cxnId="{8D2EFB51-E0DF-4DE5-A74C-596DC4DFE202}">
+      <dgm:prSet/>
+      <dgm:spPr/>
+      <dgm:t>
+        <a:bodyPr/>
+        <a:lstStyle/>
+        <a:p>
+          <a:endParaRPr lang="de-DE"/>
+        </a:p>
+      </dgm:t>
+    </dgm:pt>
+    <dgm:pt modelId="{D83750D8-0369-4DA5-87F1-D5391AE7FF16}">
+      <dgm:prSet phldrT="[Text]"/>
+      <dgm:spPr/>
+      <dgm:t>
+        <a:bodyPr/>
+        <a:lstStyle/>
+        <a:p>
+          <a:r>
+            <a:rPr lang="de-DE" dirty="0"/>
+            <a:t>(</a:t>
+          </a:r>
+          <a:r>
+            <a:rPr lang="de-DE" dirty="0" err="1"/>
+            <a:t>regex_patch</a:t>
+          </a:r>
+          <a:r>
+            <a:rPr lang="de-DE" dirty="0"/>
+            <a:t>)</a:t>
+          </a:r>
+        </a:p>
+      </dgm:t>
+    </dgm:pt>
+    <dgm:pt modelId="{8FD5F17B-D4DC-425F-A775-507FAF306EE7}" type="parTrans" cxnId="{1F9B0775-A74B-4248-AA66-DFEF4C7BDA4E}">
+      <dgm:prSet/>
+      <dgm:spPr/>
+      <dgm:t>
+        <a:bodyPr/>
+        <a:lstStyle/>
+        <a:p>
+          <a:endParaRPr lang="de-DE"/>
+        </a:p>
+      </dgm:t>
+    </dgm:pt>
+    <dgm:pt modelId="{E5ABB39A-C321-47F0-96B1-503BEB9471A8}" type="sibTrans" cxnId="{1F9B0775-A74B-4248-AA66-DFEF4C7BDA4E}">
       <dgm:prSet/>
       <dgm:spPr/>
       <dgm:t>
@@ -1308,8 +1373,10 @@
     <dgm:cxn modelId="{93D48302-AD19-4819-A1D4-0F63D129C4E0}" srcId="{A1D833BB-00E4-44BF-B180-081C7FB531E3}" destId="{B34FB8D9-9630-4571-8A1C-EE1F4D87426D}" srcOrd="2" destOrd="0" parTransId="{2EC19FB5-2EC1-45D6-8EE4-9EF374D811FE}" sibTransId="{598F79BA-D0A5-4B5B-8C5C-EB1A50EA03C2}"/>
     <dgm:cxn modelId="{EAFB200F-41B3-4294-9A51-A84AB6C676B6}" type="presOf" srcId="{8C93D72C-2825-4282-BA35-02AB660FAF7F}" destId="{2683A8A4-A7B2-4765-B75F-A51BC7A87942}" srcOrd="1" destOrd="1" presId="urn:microsoft.com/office/officeart/2005/8/layout/hProcess4"/>
     <dgm:cxn modelId="{77F1221C-D918-4E82-A663-71AED893CFF3}" type="presOf" srcId="{9283BA5B-530B-40AF-A6E6-4101F593EFE7}" destId="{EA58E709-D92F-41A0-BB58-B651C2173BA1}" srcOrd="0" destOrd="0" presId="urn:microsoft.com/office/officeart/2005/8/layout/hProcess4"/>
+    <dgm:cxn modelId="{E4DCAF1E-1F37-4B46-83F8-1B289835C2BB}" type="presOf" srcId="{D83750D8-0369-4DA5-87F1-D5391AE7FF16}" destId="{A24A886E-117B-4AF4-AD8F-86FAB64CD626}" srcOrd="0" destOrd="1" presId="urn:microsoft.com/office/officeart/2005/8/layout/hProcess4"/>
     <dgm:cxn modelId="{8423C624-08D5-4DD7-A8C7-13958ECDDF80}" type="presOf" srcId="{2743262D-7014-47AE-A66B-BCBA2F6174B8}" destId="{86FE73E0-10FB-4F1F-B0E9-F5FDED532D99}" srcOrd="0" destOrd="0" presId="urn:microsoft.com/office/officeart/2005/8/layout/hProcess4"/>
     <dgm:cxn modelId="{288CF238-98FB-4AFD-8FFA-8F8ADEAE3B3B}" type="presOf" srcId="{38CC682A-60B2-48A8-805A-DFC32ECB22BD}" destId="{5E08A94D-2999-4F07-BF0E-A1ED1AF699C9}" srcOrd="0" destOrd="0" presId="urn:microsoft.com/office/officeart/2005/8/layout/hProcess4"/>
+    <dgm:cxn modelId="{6A56305D-BBD5-44D6-903F-7C97F0C8EDD6}" type="presOf" srcId="{D83750D8-0369-4DA5-87F1-D5391AE7FF16}" destId="{0B15C886-F5B2-4B87-967E-9615133EFFC7}" srcOrd="1" destOrd="1" presId="urn:microsoft.com/office/officeart/2005/8/layout/hProcess4"/>
     <dgm:cxn modelId="{0C574B46-F5E4-4133-8050-B56891091C54}" srcId="{A1D833BB-00E4-44BF-B180-081C7FB531E3}" destId="{9283BA5B-530B-40AF-A6E6-4101F593EFE7}" srcOrd="0" destOrd="0" parTransId="{E0C8433D-DF3E-4028-9291-78071EEF596D}" sibTransId="{FEACFAB9-B8B9-45DF-A5EB-89DD68DADDAC}"/>
     <dgm:cxn modelId="{6BE6AA68-3B0F-4C52-8F91-AF6B7197E7A8}" type="presOf" srcId="{66E99792-1EFA-4727-8287-62273275D359}" destId="{86FE73E0-10FB-4F1F-B0E9-F5FDED532D99}" srcOrd="0" destOrd="2" presId="urn:microsoft.com/office/officeart/2005/8/layout/hProcess4"/>
     <dgm:cxn modelId="{753CF14A-4318-427E-94C2-91E7C803E5D6}" srcId="{BAD2B19A-C62C-4991-B1D5-4F37ECD369DD}" destId="{8C93D72C-2825-4282-BA35-02AB660FAF7F}" srcOrd="1" destOrd="0" parTransId="{59558061-444E-4782-8D3B-359574FED47F}" sibTransId="{3A5247CD-DD4E-41D5-9B8B-C345DEA1A3F3}"/>
@@ -1320,6 +1387,7 @@
     <dgm:cxn modelId="{2480AA72-F0B6-483D-90FA-000ADB08C1F9}" type="presOf" srcId="{A1D833BB-00E4-44BF-B180-081C7FB531E3}" destId="{D395EB72-3E91-41F8-8067-1098537D4155}" srcOrd="0" destOrd="0" presId="urn:microsoft.com/office/officeart/2005/8/layout/hProcess4"/>
     <dgm:cxn modelId="{37919973-DD96-4643-928C-0EF58F697EDD}" type="presOf" srcId="{AB586056-57C9-46AF-99B2-91BE63752871}" destId="{FD45DFFF-2608-4954-AA18-0DA421009F86}" srcOrd="0" destOrd="0" presId="urn:microsoft.com/office/officeart/2005/8/layout/hProcess4"/>
     <dgm:cxn modelId="{330C6574-272F-4393-9E90-AE7BEC20CCFC}" srcId="{B34FB8D9-9630-4571-8A1C-EE1F4D87426D}" destId="{AF8D88B3-20BD-49F4-A081-5C78D6E5C14D}" srcOrd="0" destOrd="0" parTransId="{4DCA540F-5C0D-4F2B-88E2-F1E9F00613BA}" sibTransId="{32CD6FA1-B8EE-4EA6-80B1-C425077736F4}"/>
+    <dgm:cxn modelId="{1F9B0775-A74B-4248-AA66-DFEF4C7BDA4E}" srcId="{B34FB8D9-9630-4571-8A1C-EE1F4D87426D}" destId="{D83750D8-0369-4DA5-87F1-D5391AE7FF16}" srcOrd="1" destOrd="0" parTransId="{8FD5F17B-D4DC-425F-A775-507FAF306EE7}" sibTransId="{E5ABB39A-C321-47F0-96B1-503BEB9471A8}"/>
     <dgm:cxn modelId="{5909B792-5561-47E0-9093-B49E891F1614}" srcId="{A1D833BB-00E4-44BF-B180-081C7FB531E3}" destId="{BAD2B19A-C62C-4991-B1D5-4F37ECD369DD}" srcOrd="1" destOrd="0" parTransId="{24E0F57E-14FF-478A-8ADF-4B47B3630F69}" sibTransId="{AB586056-57C9-46AF-99B2-91BE63752871}"/>
     <dgm:cxn modelId="{5BC81AA1-73AD-4E1F-9FCB-0656E82B3A8E}" type="presOf" srcId="{38CC682A-60B2-48A8-805A-DFC32ECB22BD}" destId="{FC7CF03D-642A-4521-99D4-936AB1D6C55A}" srcOrd="1" destOrd="0" presId="urn:microsoft.com/office/officeart/2005/8/layout/hProcess4"/>
     <dgm:cxn modelId="{D69047AB-7ED3-49FF-B997-0483E83B5828}" type="presOf" srcId="{BAD2B19A-C62C-4991-B1D5-4F37ECD369DD}" destId="{38037619-F449-469D-86F7-F0826317DAB8}" srcOrd="0" destOrd="0" presId="urn:microsoft.com/office/officeart/2005/8/layout/hProcess4"/>
@@ -1652,7 +1720,23 @@
           </a:pPr>
           <a:r>
             <a:rPr lang="de-DE" sz="1700" kern="1200" dirty="0" err="1"/>
-            <a:t>yacc.ctpl</a:t>
+            <a:t>Yacc</a:t>
+          </a:r>
+          <a:r>
+            <a:rPr lang="de-DE" sz="1700" kern="1200" dirty="0"/>
+            <a:t>(_</a:t>
+          </a:r>
+          <a:r>
+            <a:rPr lang="de-DE" sz="1700" kern="1200" dirty="0" err="1"/>
+            <a:t>opt</a:t>
+          </a:r>
+          <a:r>
+            <a:rPr lang="de-DE" sz="1700" kern="1200" dirty="0"/>
+            <a:t>).</a:t>
+          </a:r>
+          <a:r>
+            <a:rPr lang="de-DE" sz="1700" kern="1200" dirty="0" err="1"/>
+            <a:t>ctpl</a:t>
           </a:r>
           <a:endParaRPr lang="de-DE" sz="1700" kern="1200" dirty="0"/>
         </a:p>
@@ -1689,7 +1773,7 @@
           </a:pPr>
           <a:r>
             <a:rPr lang="de-DE" sz="1700" kern="1200" dirty="0"/>
-            <a:t>regex.txt</a:t>
+            <a:t>Regex.txt</a:t>
           </a:r>
         </a:p>
       </dsp:txBody>
@@ -1899,6 +1983,32 @@
             <a:t>parser.cs</a:t>
           </a:r>
           <a:endParaRPr lang="de-DE" sz="1700" kern="1200" dirty="0"/>
+        </a:p>
+        <a:p>
+          <a:pPr marL="171450" lvl="1" indent="-171450" algn="l" defTabSz="755650">
+            <a:lnSpc>
+              <a:spcPct val="90000"/>
+            </a:lnSpc>
+            <a:spcBef>
+              <a:spcPct val="0"/>
+            </a:spcBef>
+            <a:spcAft>
+              <a:spcPct val="15000"/>
+            </a:spcAft>
+            <a:buChar char="•"/>
+          </a:pPr>
+          <a:r>
+            <a:rPr lang="de-DE" sz="1700" kern="1200" dirty="0"/>
+            <a:t>(</a:t>
+          </a:r>
+          <a:r>
+            <a:rPr lang="de-DE" sz="1700" kern="1200" dirty="0" err="1"/>
+            <a:t>regex_patch</a:t>
+          </a:r>
+          <a:r>
+            <a:rPr lang="de-DE" sz="1700" kern="1200" dirty="0"/>
+            <a:t>)</a:t>
+          </a:r>
         </a:p>
       </dsp:txBody>
       <dsp:txXfrm>
@@ -3715,7 +3825,7 @@
           <a:p>
             <a:fld id="{DF53FDCC-A6EE-4065-95BC-3DAF8DE3D898}" type="datetimeFigureOut">
               <a:rPr lang="de-DE" smtClean="0"/>
-              <a:t>03.10.2022</a:t>
+              <a:t>14.11.2022</a:t>
             </a:fld>
             <a:endParaRPr lang="de-DE"/>
           </a:p>
@@ -3913,7 +4023,7 @@
           <a:p>
             <a:fld id="{DF53FDCC-A6EE-4065-95BC-3DAF8DE3D898}" type="datetimeFigureOut">
               <a:rPr lang="de-DE" smtClean="0"/>
-              <a:t>03.10.2022</a:t>
+              <a:t>14.11.2022</a:t>
             </a:fld>
             <a:endParaRPr lang="de-DE"/>
           </a:p>
@@ -4121,7 +4231,7 @@
           <a:p>
             <a:fld id="{DF53FDCC-A6EE-4065-95BC-3DAF8DE3D898}" type="datetimeFigureOut">
               <a:rPr lang="de-DE" smtClean="0"/>
-              <a:t>03.10.2022</a:t>
+              <a:t>14.11.2022</a:t>
             </a:fld>
             <a:endParaRPr lang="de-DE"/>
           </a:p>
@@ -4319,7 +4429,7 @@
           <a:p>
             <a:fld id="{DF53FDCC-A6EE-4065-95BC-3DAF8DE3D898}" type="datetimeFigureOut">
               <a:rPr lang="de-DE" smtClean="0"/>
-              <a:t>03.10.2022</a:t>
+              <a:t>14.11.2022</a:t>
             </a:fld>
             <a:endParaRPr lang="de-DE"/>
           </a:p>
@@ -4594,7 +4704,7 @@
           <a:p>
             <a:fld id="{DF53FDCC-A6EE-4065-95BC-3DAF8DE3D898}" type="datetimeFigureOut">
               <a:rPr lang="de-DE" smtClean="0"/>
-              <a:t>03.10.2022</a:t>
+              <a:t>14.11.2022</a:t>
             </a:fld>
             <a:endParaRPr lang="de-DE"/>
           </a:p>
@@ -4859,7 +4969,7 @@
           <a:p>
             <a:fld id="{DF53FDCC-A6EE-4065-95BC-3DAF8DE3D898}" type="datetimeFigureOut">
               <a:rPr lang="de-DE" smtClean="0"/>
-              <a:t>03.10.2022</a:t>
+              <a:t>14.11.2022</a:t>
             </a:fld>
             <a:endParaRPr lang="de-DE"/>
           </a:p>
@@ -5271,7 +5381,7 @@
           <a:p>
             <a:fld id="{DF53FDCC-A6EE-4065-95BC-3DAF8DE3D898}" type="datetimeFigureOut">
               <a:rPr lang="de-DE" smtClean="0"/>
-              <a:t>03.10.2022</a:t>
+              <a:t>14.11.2022</a:t>
             </a:fld>
             <a:endParaRPr lang="de-DE"/>
           </a:p>
@@ -5412,7 +5522,7 @@
           <a:p>
             <a:fld id="{DF53FDCC-A6EE-4065-95BC-3DAF8DE3D898}" type="datetimeFigureOut">
               <a:rPr lang="de-DE" smtClean="0"/>
-              <a:t>03.10.2022</a:t>
+              <a:t>14.11.2022</a:t>
             </a:fld>
             <a:endParaRPr lang="de-DE"/>
           </a:p>
@@ -5525,7 +5635,7 @@
           <a:p>
             <a:fld id="{DF53FDCC-A6EE-4065-95BC-3DAF8DE3D898}" type="datetimeFigureOut">
               <a:rPr lang="de-DE" smtClean="0"/>
-              <a:t>03.10.2022</a:t>
+              <a:t>14.11.2022</a:t>
             </a:fld>
             <a:endParaRPr lang="de-DE"/>
           </a:p>
@@ -5836,7 +5946,7 @@
           <a:p>
             <a:fld id="{DF53FDCC-A6EE-4065-95BC-3DAF8DE3D898}" type="datetimeFigureOut">
               <a:rPr lang="de-DE" smtClean="0"/>
-              <a:t>03.10.2022</a:t>
+              <a:t>14.11.2022</a:t>
             </a:fld>
             <a:endParaRPr lang="de-DE"/>
           </a:p>
@@ -6124,7 +6234,7 @@
           <a:p>
             <a:fld id="{DF53FDCC-A6EE-4065-95BC-3DAF8DE3D898}" type="datetimeFigureOut">
               <a:rPr lang="de-DE" smtClean="0"/>
-              <a:t>03.10.2022</a:t>
+              <a:t>14.11.2022</a:t>
             </a:fld>
             <a:endParaRPr lang="de-DE"/>
           </a:p>
@@ -6365,7 +6475,7 @@
           <a:p>
             <a:fld id="{DF53FDCC-A6EE-4065-95BC-3DAF8DE3D898}" type="datetimeFigureOut">
               <a:rPr lang="de-DE" smtClean="0"/>
-              <a:t>03.10.2022</a:t>
+              <a:t>14.11.2022</a:t>
             </a:fld>
             <a:endParaRPr lang="de-DE"/>
           </a:p>
@@ -6903,7 +7013,7 @@
           <p:nvPr>
             <p:extLst>
               <p:ext uri="{D42A27DB-BD31-4B8C-83A1-F6EECF244321}">
-                <p14:modId xmlns:p14="http://schemas.microsoft.com/office/powerpoint/2010/main" val="4152817445"/>
+                <p14:modId xmlns:p14="http://schemas.microsoft.com/office/powerpoint/2010/main" val="2603060818"/>
               </p:ext>
             </p:extLst>
           </p:nvPr>
@@ -7263,6 +7373,49 @@
           </a:fontRef>
         </p:style>
       </p:sp>
+      <p:cxnSp>
+        <p:nvCxnSpPr>
+          <p:cNvPr id="2" name="Verbinder: gekrümmt 1">
+            <a:extLst>
+              <a:ext uri="{FF2B5EF4-FFF2-40B4-BE49-F238E27FC236}">
+                <a16:creationId xmlns:a16="http://schemas.microsoft.com/office/drawing/2014/main" id="{60D777E7-A01D-1055-AEE3-ADC49305702B}"/>
+              </a:ext>
+            </a:extLst>
+          </p:cNvPr>
+          <p:cNvCxnSpPr>
+            <a:cxnSpLocks/>
+          </p:cNvCxnSpPr>
+          <p:nvPr/>
+        </p:nvCxnSpPr>
+        <p:spPr>
+          <a:xfrm rot="16200000" flipV="1">
+            <a:off x="7203448" y="2366753"/>
+            <a:ext cx="191420" cy="128337"/>
+          </a:xfrm>
+          <a:prstGeom prst="curvedConnector3">
+            <a:avLst>
+              <a:gd name="adj1" fmla="val 50000"/>
+            </a:avLst>
+          </a:prstGeom>
+          <a:ln w="25400">
+            <a:tailEnd type="triangle"/>
+          </a:ln>
+        </p:spPr>
+        <p:style>
+          <a:lnRef idx="1">
+            <a:schemeClr val="dk1"/>
+          </a:lnRef>
+          <a:fillRef idx="0">
+            <a:schemeClr val="dk1"/>
+          </a:fillRef>
+          <a:effectRef idx="0">
+            <a:schemeClr val="dk1"/>
+          </a:effectRef>
+          <a:fontRef idx="minor">
+            <a:schemeClr val="tx1"/>
+          </a:fontRef>
+        </p:style>
+      </p:cxnSp>
     </p:spTree>
     <p:extLst>
       <p:ext uri="{BB962C8B-B14F-4D97-AF65-F5344CB8AC3E}">

</xml_diff>

<commit_message>
Switch from serialization to linked nodes (perf boost)
</commit_message>
<xml_diff>
--- a/process.pptx
+++ b/process.pptx
@@ -3706,9 +3706,10 @@
         <a:lstStyle/>
         <a:p>
           <a:r>
-            <a:rPr lang="de-DE" dirty="0"/>
-            <a:t>Parse</a:t>
+            <a:rPr lang="de-DE" dirty="0" err="1"/>
+            <a:t>Pre-processor</a:t>
           </a:r>
+          <a:endParaRPr lang="de-DE" dirty="0"/>
         </a:p>
       </dgm:t>
     </dgm:pt>
@@ -3742,8 +3743,12 @@
         <a:lstStyle/>
         <a:p>
           <a:r>
+            <a:rPr lang="de-DE" dirty="0" err="1"/>
+            <a:t>Merged</a:t>
+          </a:r>
+          <a:r>
             <a:rPr lang="de-DE" dirty="0"/>
-            <a:t>Unsorted Objects</a:t>
+            <a:t> WDL code</a:t>
           </a:r>
         </a:p>
       </dgm:t>
@@ -3779,7 +3784,7 @@
         <a:p>
           <a:r>
             <a:rPr lang="de-DE" dirty="0"/>
-            <a:t>Serialize</a:t>
+            <a:t>Scanner</a:t>
           </a:r>
         </a:p>
       </dgm:t>
@@ -3815,7 +3820,7 @@
         <a:p>
           <a:r>
             <a:rPr lang="de-DE" dirty="0"/>
-            <a:t>Stream</a:t>
+            <a:t>Tokens</a:t>
           </a:r>
         </a:p>
       </dgm:t>
@@ -3851,7 +3856,7 @@
         <a:p>
           <a:r>
             <a:rPr lang="de-DE" dirty="0"/>
-            <a:t>Deserialize</a:t>
+            <a:t>Parser</a:t>
           </a:r>
         </a:p>
       </dgm:t>
@@ -3886,8 +3891,12 @@
         <a:lstStyle/>
         <a:p>
           <a:r>
+            <a:rPr lang="de-DE" dirty="0" err="1"/>
+            <a:t>Linked</a:t>
+          </a:r>
+          <a:r>
             <a:rPr lang="de-DE" dirty="0"/>
-            <a:t>Sorted Objects</a:t>
+            <a:t> Objects</a:t>
           </a:r>
         </a:p>
       </dgm:t>
@@ -3959,7 +3968,7 @@
         <a:p>
           <a:r>
             <a:rPr lang="de-DE" dirty="0"/>
-            <a:t>Class Definition</a:t>
+            <a:t>C# code</a:t>
           </a:r>
         </a:p>
       </dgm:t>
@@ -4232,14 +4241,14 @@
       </dgm:t>
     </dgm:pt>
     <dgm:pt modelId="{3738DB35-08F0-4A35-ADCF-C29A678C32B0}">
-      <dgm:prSet phldrT="[Text]"/>
+      <dgm:prSet phldrT="[Text]" custT="1"/>
       <dgm:spPr/>
       <dgm:t>
         <a:bodyPr/>
         <a:lstStyle/>
         <a:p>
           <a:r>
-            <a:rPr lang="de-DE" dirty="0"/>
+            <a:rPr lang="de-DE" sz="2800" dirty="0"/>
             <a:t>Parser (generated)</a:t>
           </a:r>
         </a:p>
@@ -4268,14 +4277,14 @@
       </dgm:t>
     </dgm:pt>
     <dgm:pt modelId="{372426CC-4374-4251-B326-BB4B8AFE9AA4}">
-      <dgm:prSet phldrT="[Text]"/>
+      <dgm:prSet phldrT="[Text]" custT="1"/>
       <dgm:spPr/>
       <dgm:t>
         <a:bodyPr/>
         <a:lstStyle/>
         <a:p>
           <a:r>
-            <a:rPr lang="de-DE" dirty="0"/>
+            <a:rPr lang="de-DE" sz="2800" dirty="0"/>
             <a:t>Static Interfaces</a:t>
           </a:r>
         </a:p>
@@ -4304,15 +4313,18 @@
       </dgm:t>
     </dgm:pt>
     <dgm:pt modelId="{7B38EE85-1839-446B-A75A-18818B4CAEF8}">
-      <dgm:prSet phldrT="[Text]"/>
+      <dgm:prSet phldrT="[Text]" custT="1"/>
       <dgm:spPr/>
       <dgm:t>
         <a:bodyPr/>
         <a:lstStyle/>
         <a:p>
           <a:pPr algn="ctr"/>
+          <a:br>
+            <a:rPr lang="de-DE" sz="2800" dirty="0"/>
+          </a:br>
           <a:r>
-            <a:rPr lang="de-DE" sz="3400" dirty="0"/>
+            <a:rPr lang="de-DE" sz="2800" dirty="0"/>
             <a:t>Core Modules</a:t>
           </a:r>
         </a:p>
@@ -4349,8 +4361,12 @@
         <a:p>
           <a:pPr algn="l"/>
           <a:r>
+            <a:rPr lang="de-DE" sz="1600" dirty="0" err="1"/>
+            <a:t>Linked</a:t>
+          </a:r>
+          <a:r>
             <a:rPr lang="de-DE" sz="1600" dirty="0"/>
-            <a:t>Serializable Objects</a:t>
+            <a:t> Objects (Nodes)</a:t>
           </a:r>
         </a:p>
       </dgm:t>
@@ -4414,6 +4430,44 @@
         </a:p>
       </dgm:t>
     </dgm:pt>
+    <dgm:pt modelId="{B8D738B6-5F01-43FE-B126-650FA49E8813}">
+      <dgm:prSet phldrT="[Text]" custT="1"/>
+      <dgm:spPr/>
+      <dgm:t>
+        <a:bodyPr/>
+        <a:lstStyle/>
+        <a:p>
+          <a:pPr algn="l"/>
+          <a:r>
+            <a:rPr lang="de-DE" sz="1600" dirty="0" err="1"/>
+            <a:t>Preprocessor</a:t>
+          </a:r>
+          <a:endParaRPr lang="de-DE" sz="1600" dirty="0"/>
+        </a:p>
+      </dgm:t>
+    </dgm:pt>
+    <dgm:pt modelId="{58597B65-141F-4154-AF6C-EAB0DB939FEE}" type="parTrans" cxnId="{A2CD4448-50DB-4DB7-B406-077438146611}">
+      <dgm:prSet/>
+      <dgm:spPr/>
+      <dgm:t>
+        <a:bodyPr/>
+        <a:lstStyle/>
+        <a:p>
+          <a:endParaRPr lang="de-DE"/>
+        </a:p>
+      </dgm:t>
+    </dgm:pt>
+    <dgm:pt modelId="{8EB86BA0-6A93-4392-84E1-60F42EFD6597}" type="sibTrans" cxnId="{A2CD4448-50DB-4DB7-B406-077438146611}">
+      <dgm:prSet/>
+      <dgm:spPr/>
+      <dgm:t>
+        <a:bodyPr/>
+        <a:lstStyle/>
+        <a:p>
+          <a:endParaRPr lang="de-DE"/>
+        </a:p>
+      </dgm:t>
+    </dgm:pt>
     <dgm:pt modelId="{8E390DCE-7251-40F6-903B-BD0DB0F2A6F1}" type="pres">
       <dgm:prSet presAssocID="{FB031857-7772-4E0A-BEFB-5D1DE6531F07}" presName="composite" presStyleCnt="0">
         <dgm:presLayoutVars>
@@ -4464,17 +4518,19 @@
   <dgm:cxnLst>
     <dgm:cxn modelId="{DEA70803-8B6B-4E35-A60D-344FE876F7C1}" type="presOf" srcId="{7B38EE85-1839-446B-A75A-18818B4CAEF8}" destId="{DD994494-38FC-4783-90AB-B1DBAD6616A9}" srcOrd="0" destOrd="0" presId="urn:microsoft.com/office/officeart/2005/8/layout/hList3"/>
     <dgm:cxn modelId="{AA490209-9710-4CE0-99F1-0CEFF6AED356}" type="presOf" srcId="{372426CC-4374-4251-B326-BB4B8AFE9AA4}" destId="{5A4B9615-9E35-476E-B0B3-05DC87EDBB4D}" srcOrd="0" destOrd="0" presId="urn:microsoft.com/office/officeart/2005/8/layout/hList3"/>
-    <dgm:cxn modelId="{D4B85923-0A46-480E-A747-5A7BDC4C56BC}" type="presOf" srcId="{95993613-5022-46FB-9679-16B5C726895C}" destId="{DD994494-38FC-4783-90AB-B1DBAD6616A9}" srcOrd="0" destOrd="2" presId="urn:microsoft.com/office/officeart/2005/8/layout/hList3"/>
+    <dgm:cxn modelId="{D4B85923-0A46-480E-A747-5A7BDC4C56BC}" type="presOf" srcId="{95993613-5022-46FB-9679-16B5C726895C}" destId="{DD994494-38FC-4783-90AB-B1DBAD6616A9}" srcOrd="0" destOrd="3" presId="urn:microsoft.com/office/officeart/2005/8/layout/hList3"/>
     <dgm:cxn modelId="{8F014A24-96AB-4AA9-A539-38578377782B}" type="presOf" srcId="{571BFBB8-4D0A-4D5C-AEFF-099C8077055A}" destId="{4E4C1B6D-36BD-46A1-8A2A-6A945501CF1C}" srcOrd="0" destOrd="0" presId="urn:microsoft.com/office/officeart/2005/8/layout/hList3"/>
-    <dgm:cxn modelId="{1D35F460-A6E7-42E4-80D4-0A0E68EA5616}" srcId="{7B38EE85-1839-446B-A75A-18818B4CAEF8}" destId="{95993613-5022-46FB-9679-16B5C726895C}" srcOrd="1" destOrd="0" parTransId="{4BA86101-464E-4D8E-B2AB-0B9EBAECDCAE}" sibTransId="{09C12117-9E21-4E61-8AF8-36E1D80D36B5}"/>
+    <dgm:cxn modelId="{1D35F460-A6E7-42E4-80D4-0A0E68EA5616}" srcId="{7B38EE85-1839-446B-A75A-18818B4CAEF8}" destId="{95993613-5022-46FB-9679-16B5C726895C}" srcOrd="2" destOrd="0" parTransId="{4BA86101-464E-4D8E-B2AB-0B9EBAECDCAE}" sibTransId="{09C12117-9E21-4E61-8AF8-36E1D80D36B5}"/>
     <dgm:cxn modelId="{4D050044-6AF0-4B88-AE33-002B6F7D11C5}" type="presOf" srcId="{3738DB35-08F0-4A35-ADCF-C29A678C32B0}" destId="{7983E5E0-332D-4B1D-9539-11C27F7E346A}" srcOrd="0" destOrd="0" presId="urn:microsoft.com/office/officeart/2005/8/layout/hList3"/>
+    <dgm:cxn modelId="{A2CD4448-50DB-4DB7-B406-077438146611}" srcId="{7B38EE85-1839-446B-A75A-18818B4CAEF8}" destId="{B8D738B6-5F01-43FE-B126-650FA49E8813}" srcOrd="0" destOrd="0" parTransId="{58597B65-141F-4154-AF6C-EAB0DB939FEE}" sibTransId="{8EB86BA0-6A93-4392-84E1-60F42EFD6597}"/>
     <dgm:cxn modelId="{E0774976-123B-4174-8C67-42F1A60B7B47}" srcId="{571BFBB8-4D0A-4D5C-AEFF-099C8077055A}" destId="{3738DB35-08F0-4A35-ADCF-C29A678C32B0}" srcOrd="0" destOrd="0" parTransId="{B2C3E4D5-BC3E-43C0-9DE6-1B46D37F34F0}" sibTransId="{30FC7989-CBAF-493F-ADB0-0EA59B42D39D}"/>
     <dgm:cxn modelId="{FE6EF07A-C1ED-4806-9D8C-9852595C5672}" type="presOf" srcId="{FB031857-7772-4E0A-BEFB-5D1DE6531F07}" destId="{8E390DCE-7251-40F6-903B-BD0DB0F2A6F1}" srcOrd="0" destOrd="0" presId="urn:microsoft.com/office/officeart/2005/8/layout/hList3"/>
-    <dgm:cxn modelId="{D3483D7F-5CBB-438B-8282-1691FDF654A9}" type="presOf" srcId="{A8696EAA-7126-4104-80AE-AFD4D8B0F9B2}" destId="{DD994494-38FC-4783-90AB-B1DBAD6616A9}" srcOrd="0" destOrd="1" presId="urn:microsoft.com/office/officeart/2005/8/layout/hList3"/>
+    <dgm:cxn modelId="{D3483D7F-5CBB-438B-8282-1691FDF654A9}" type="presOf" srcId="{A8696EAA-7126-4104-80AE-AFD4D8B0F9B2}" destId="{DD994494-38FC-4783-90AB-B1DBAD6616A9}" srcOrd="0" destOrd="2" presId="urn:microsoft.com/office/officeart/2005/8/layout/hList3"/>
+    <dgm:cxn modelId="{5FB58880-E7D7-4AF2-A83C-A80D20C73A94}" type="presOf" srcId="{B8D738B6-5F01-43FE-B126-650FA49E8813}" destId="{DD994494-38FC-4783-90AB-B1DBAD6616A9}" srcOrd="0" destOrd="1" presId="urn:microsoft.com/office/officeart/2005/8/layout/hList3"/>
     <dgm:cxn modelId="{8FCB5988-809F-44F0-8F5C-3798F1F8FCFC}" srcId="{571BFBB8-4D0A-4D5C-AEFF-099C8077055A}" destId="{372426CC-4374-4251-B326-BB4B8AFE9AA4}" srcOrd="1" destOrd="0" parTransId="{B81C23FA-1906-4321-9649-06A31A19F126}" sibTransId="{3D9FA892-F357-462F-B87E-5C715361A0A5}"/>
     <dgm:cxn modelId="{E1CBF1A5-9608-496B-A36B-243CD11478D1}" srcId="{571BFBB8-4D0A-4D5C-AEFF-099C8077055A}" destId="{7B38EE85-1839-446B-A75A-18818B4CAEF8}" srcOrd="2" destOrd="0" parTransId="{07B960C6-E5A9-404B-B4DF-2584EC2ECAE0}" sibTransId="{20616FE4-8E3E-4A88-BEF9-274238A90871}"/>
     <dgm:cxn modelId="{90FB5FCA-140F-4F01-B619-35C537B85D5F}" srcId="{FB031857-7772-4E0A-BEFB-5D1DE6531F07}" destId="{571BFBB8-4D0A-4D5C-AEFF-099C8077055A}" srcOrd="0" destOrd="0" parTransId="{F6390289-50D9-403D-AE7E-EBC4685B2FFB}" sibTransId="{425A04A5-1C72-456C-8C3C-88343B736D60}"/>
-    <dgm:cxn modelId="{4146EBF9-2842-4517-8F25-69126F24581E}" srcId="{7B38EE85-1839-446B-A75A-18818B4CAEF8}" destId="{A8696EAA-7126-4104-80AE-AFD4D8B0F9B2}" srcOrd="0" destOrd="0" parTransId="{A8CA50AF-CBED-4383-BE2C-6191A977A339}" sibTransId="{49FD9897-5306-45D4-8B1C-1E06527B4D67}"/>
+    <dgm:cxn modelId="{4146EBF9-2842-4517-8F25-69126F24581E}" srcId="{7B38EE85-1839-446B-A75A-18818B4CAEF8}" destId="{A8696EAA-7126-4104-80AE-AFD4D8B0F9B2}" srcOrd="1" destOrd="0" parTransId="{A8CA50AF-CBED-4383-BE2C-6191A977A339}" sibTransId="{49FD9897-5306-45D4-8B1C-1E06527B4D67}"/>
     <dgm:cxn modelId="{5F1DB81D-E7FB-420C-98FA-87C54A1892B5}" type="presParOf" srcId="{8E390DCE-7251-40F6-903B-BD0DB0F2A6F1}" destId="{4E4C1B6D-36BD-46A1-8A2A-6A945501CF1C}" srcOrd="0" destOrd="0" presId="urn:microsoft.com/office/officeart/2005/8/layout/hList3"/>
     <dgm:cxn modelId="{D4A1FABB-D276-4F2B-85DD-9291CA37C11D}" type="presParOf" srcId="{8E390DCE-7251-40F6-903B-BD0DB0F2A6F1}" destId="{19286DA5-86AA-4768-974D-EBB534D4AC3A}" srcOrd="1" destOrd="0" presId="urn:microsoft.com/office/officeart/2005/8/layout/hList3"/>
     <dgm:cxn modelId="{691ADF91-7EB1-403D-B81A-B8A30B65033A}" type="presParOf" srcId="{19286DA5-86AA-4768-974D-EBB534D4AC3A}" destId="{7983E5E0-332D-4B1D-9539-11C27F7E346A}" srcOrd="0" destOrd="0" presId="urn:microsoft.com/office/officeart/2005/8/layout/hList3"/>
@@ -5754,12 +5810,12 @@
         <a:fontRef idx="minor"/>
       </dsp:style>
       <dsp:txBody>
-        <a:bodyPr spcFirstLastPara="0" vert="horz" wrap="square" lIns="38100" tIns="9525" rIns="19050" bIns="9525" numCol="1" spcCol="1270" anchor="ctr" anchorCtr="0">
+        <a:bodyPr spcFirstLastPara="0" vert="horz" wrap="square" lIns="48260" tIns="12065" rIns="24130" bIns="12065" numCol="1" spcCol="1270" anchor="ctr" anchorCtr="0">
           <a:noAutofit/>
         </a:bodyPr>
         <a:lstStyle/>
         <a:p>
-          <a:pPr marL="0" lvl="0" indent="0" algn="ctr" defTabSz="666750">
+          <a:pPr marL="0" lvl="0" indent="0" algn="ctr" defTabSz="844550">
             <a:lnSpc>
               <a:spcPct val="90000"/>
             </a:lnSpc>
@@ -5772,8 +5828,12 @@
             <a:buNone/>
           </a:pPr>
           <a:r>
-            <a:rPr lang="de-DE" sz="1500" kern="1200" dirty="0"/>
-            <a:t>Unsorted Objects</a:t>
+            <a:rPr lang="de-DE" sz="1900" kern="1200" dirty="0" err="1"/>
+            <a:t>Merged</a:t>
+          </a:r>
+          <a:r>
+            <a:rPr lang="de-DE" sz="1900" kern="1200" dirty="0"/>
+            <a:t> WDL code</a:t>
           </a:r>
         </a:p>
       </dsp:txBody>
@@ -5832,12 +5892,12 @@
         </a:fontRef>
       </dsp:style>
       <dsp:txBody>
-        <a:bodyPr spcFirstLastPara="0" vert="horz" wrap="square" lIns="6350" tIns="6350" rIns="6350" bIns="6350" numCol="1" spcCol="1270" anchor="ctr" anchorCtr="0">
+        <a:bodyPr spcFirstLastPara="0" vert="horz" wrap="square" lIns="6985" tIns="6985" rIns="6985" bIns="6985" numCol="1" spcCol="1270" anchor="ctr" anchorCtr="0">
           <a:noAutofit/>
         </a:bodyPr>
         <a:lstStyle/>
         <a:p>
-          <a:pPr marL="0" lvl="0" indent="0" algn="ctr" defTabSz="444500">
+          <a:pPr marL="0" lvl="0" indent="0" algn="ctr" defTabSz="488950">
             <a:lnSpc>
               <a:spcPct val="90000"/>
             </a:lnSpc>
@@ -5850,9 +5910,10 @@
             <a:buNone/>
           </a:pPr>
           <a:r>
-            <a:rPr lang="de-DE" sz="1000" kern="1200" dirty="0"/>
-            <a:t>Parse</a:t>
+            <a:rPr lang="de-DE" sz="1100" kern="1200" dirty="0" err="1"/>
+            <a:t>Pre-processor</a:t>
           </a:r>
+          <a:endParaRPr lang="de-DE" sz="1100" kern="1200" dirty="0"/>
         </a:p>
       </dsp:txBody>
       <dsp:txXfrm>
@@ -5915,12 +5976,12 @@
         <a:fontRef idx="minor"/>
       </dsp:style>
       <dsp:txBody>
-        <a:bodyPr spcFirstLastPara="0" vert="horz" wrap="square" lIns="38100" tIns="9525" rIns="19050" bIns="9525" numCol="1" spcCol="1270" anchor="ctr" anchorCtr="0">
+        <a:bodyPr spcFirstLastPara="0" vert="horz" wrap="square" lIns="48260" tIns="12065" rIns="24130" bIns="12065" numCol="1" spcCol="1270" anchor="ctr" anchorCtr="0">
           <a:noAutofit/>
         </a:bodyPr>
         <a:lstStyle/>
         <a:p>
-          <a:pPr marL="0" lvl="0" indent="0" algn="ctr" defTabSz="666750">
+          <a:pPr marL="0" lvl="0" indent="0" algn="ctr" defTabSz="844550">
             <a:lnSpc>
               <a:spcPct val="90000"/>
             </a:lnSpc>
@@ -5933,8 +5994,8 @@
             <a:buNone/>
           </a:pPr>
           <a:r>
-            <a:rPr lang="de-DE" sz="1500" kern="1200" dirty="0"/>
-            <a:t>Stream</a:t>
+            <a:rPr lang="de-DE" sz="1900" kern="1200" dirty="0"/>
+            <a:t>Tokens</a:t>
           </a:r>
         </a:p>
       </dsp:txBody>
@@ -5993,12 +6054,12 @@
         </a:fontRef>
       </dsp:style>
       <dsp:txBody>
-        <a:bodyPr spcFirstLastPara="0" vert="horz" wrap="square" lIns="6350" tIns="6350" rIns="6350" bIns="6350" numCol="1" spcCol="1270" anchor="ctr" anchorCtr="0">
+        <a:bodyPr spcFirstLastPara="0" vert="horz" wrap="square" lIns="6985" tIns="6985" rIns="6985" bIns="6985" numCol="1" spcCol="1270" anchor="ctr" anchorCtr="0">
           <a:noAutofit/>
         </a:bodyPr>
         <a:lstStyle/>
         <a:p>
-          <a:pPr marL="0" lvl="0" indent="0" algn="ctr" defTabSz="444500">
+          <a:pPr marL="0" lvl="0" indent="0" algn="ctr" defTabSz="488950">
             <a:lnSpc>
               <a:spcPct val="90000"/>
             </a:lnSpc>
@@ -6011,8 +6072,8 @@
             <a:buNone/>
           </a:pPr>
           <a:r>
-            <a:rPr lang="de-DE" sz="1000" kern="1200" dirty="0"/>
-            <a:t>Serialize</a:t>
+            <a:rPr lang="de-DE" sz="1100" kern="1200" dirty="0"/>
+            <a:t>Scanner</a:t>
           </a:r>
         </a:p>
       </dsp:txBody>
@@ -6076,12 +6137,12 @@
         <a:fontRef idx="minor"/>
       </dsp:style>
       <dsp:txBody>
-        <a:bodyPr spcFirstLastPara="0" vert="horz" wrap="square" lIns="38100" tIns="9525" rIns="19050" bIns="9525" numCol="1" spcCol="1270" anchor="ctr" anchorCtr="0">
+        <a:bodyPr spcFirstLastPara="0" vert="horz" wrap="square" lIns="48260" tIns="12065" rIns="24130" bIns="12065" numCol="1" spcCol="1270" anchor="ctr" anchorCtr="0">
           <a:noAutofit/>
         </a:bodyPr>
         <a:lstStyle/>
         <a:p>
-          <a:pPr marL="0" lvl="0" indent="0" algn="ctr" defTabSz="666750">
+          <a:pPr marL="0" lvl="0" indent="0" algn="ctr" defTabSz="844550">
             <a:lnSpc>
               <a:spcPct val="90000"/>
             </a:lnSpc>
@@ -6094,8 +6155,12 @@
             <a:buNone/>
           </a:pPr>
           <a:r>
-            <a:rPr lang="de-DE" sz="1500" kern="1200" dirty="0"/>
-            <a:t>Sorted Objects</a:t>
+            <a:rPr lang="de-DE" sz="1900" kern="1200" dirty="0" err="1"/>
+            <a:t>Linked</a:t>
+          </a:r>
+          <a:r>
+            <a:rPr lang="de-DE" sz="1900" kern="1200" dirty="0"/>
+            <a:t> Objects</a:t>
           </a:r>
         </a:p>
       </dsp:txBody>
@@ -6154,12 +6219,12 @@
         </a:fontRef>
       </dsp:style>
       <dsp:txBody>
-        <a:bodyPr spcFirstLastPara="0" vert="horz" wrap="square" lIns="6350" tIns="6350" rIns="6350" bIns="6350" numCol="1" spcCol="1270" anchor="ctr" anchorCtr="0">
+        <a:bodyPr spcFirstLastPara="0" vert="horz" wrap="square" lIns="6985" tIns="6985" rIns="6985" bIns="6985" numCol="1" spcCol="1270" anchor="ctr" anchorCtr="0">
           <a:noAutofit/>
         </a:bodyPr>
         <a:lstStyle/>
         <a:p>
-          <a:pPr marL="0" lvl="0" indent="0" algn="ctr" defTabSz="444500">
+          <a:pPr marL="0" lvl="0" indent="0" algn="ctr" defTabSz="488950">
             <a:lnSpc>
               <a:spcPct val="90000"/>
             </a:lnSpc>
@@ -6172,8 +6237,8 @@
             <a:buNone/>
           </a:pPr>
           <a:r>
-            <a:rPr lang="de-DE" sz="1000" kern="1200" dirty="0"/>
-            <a:t>Deserialize</a:t>
+            <a:rPr lang="de-DE" sz="1100" kern="1200" dirty="0"/>
+            <a:t>Parser</a:t>
           </a:r>
         </a:p>
       </dsp:txBody>
@@ -6237,12 +6302,12 @@
         <a:fontRef idx="minor"/>
       </dsp:style>
       <dsp:txBody>
-        <a:bodyPr spcFirstLastPara="0" vert="horz" wrap="square" lIns="38100" tIns="9525" rIns="19050" bIns="9525" numCol="1" spcCol="1270" anchor="ctr" anchorCtr="0">
+        <a:bodyPr spcFirstLastPara="0" vert="horz" wrap="square" lIns="48260" tIns="12065" rIns="24130" bIns="12065" numCol="1" spcCol="1270" anchor="ctr" anchorCtr="0">
           <a:noAutofit/>
         </a:bodyPr>
         <a:lstStyle/>
         <a:p>
-          <a:pPr marL="0" lvl="0" indent="0" algn="ctr" defTabSz="666750">
+          <a:pPr marL="0" lvl="0" indent="0" algn="ctr" defTabSz="844550">
             <a:lnSpc>
               <a:spcPct val="90000"/>
             </a:lnSpc>
@@ -6255,8 +6320,8 @@
             <a:buNone/>
           </a:pPr>
           <a:r>
-            <a:rPr lang="de-DE" sz="1500" kern="1200" dirty="0"/>
-            <a:t>Class Definition</a:t>
+            <a:rPr lang="de-DE" sz="1900" kern="1200" dirty="0"/>
+            <a:t>C# code</a:t>
           </a:r>
         </a:p>
       </dsp:txBody>
@@ -6315,12 +6380,12 @@
         </a:fontRef>
       </dsp:style>
       <dsp:txBody>
-        <a:bodyPr spcFirstLastPara="0" vert="horz" wrap="square" lIns="6350" tIns="6350" rIns="6350" bIns="6350" numCol="1" spcCol="1270" anchor="ctr" anchorCtr="0">
+        <a:bodyPr spcFirstLastPara="0" vert="horz" wrap="square" lIns="6985" tIns="6985" rIns="6985" bIns="6985" numCol="1" spcCol="1270" anchor="ctr" anchorCtr="0">
           <a:noAutofit/>
         </a:bodyPr>
         <a:lstStyle/>
         <a:p>
-          <a:pPr marL="0" lvl="0" indent="0" algn="ctr" defTabSz="444500">
+          <a:pPr marL="0" lvl="0" indent="0" algn="ctr" defTabSz="488950">
             <a:lnSpc>
               <a:spcPct val="90000"/>
             </a:lnSpc>
@@ -6333,7 +6398,7 @@
             <a:buNone/>
           </a:pPr>
           <a:r>
-            <a:rPr lang="de-DE" sz="1000" kern="1200" dirty="0"/>
+            <a:rPr lang="de-DE" sz="1100" kern="1200" dirty="0"/>
             <a:t>Format</a:t>
           </a:r>
         </a:p>
@@ -6473,12 +6538,12 @@
         </a:fontRef>
       </dsp:style>
       <dsp:txBody>
-        <a:bodyPr spcFirstLastPara="0" vert="horz" wrap="square" lIns="129540" tIns="129540" rIns="129540" bIns="129540" numCol="1" spcCol="1270" anchor="ctr" anchorCtr="0">
+        <a:bodyPr spcFirstLastPara="0" vert="horz" wrap="square" lIns="106680" tIns="106680" rIns="106680" bIns="106680" numCol="1" spcCol="1270" anchor="ctr" anchorCtr="0">
           <a:noAutofit/>
         </a:bodyPr>
         <a:lstStyle/>
         <a:p>
-          <a:pPr marL="0" lvl="0" indent="0" algn="ctr" defTabSz="1511300">
+          <a:pPr marL="0" lvl="0" indent="0" algn="ctr" defTabSz="1244600">
             <a:lnSpc>
               <a:spcPct val="90000"/>
             </a:lnSpc>
@@ -6491,7 +6556,7 @@
             <a:buNone/>
           </a:pPr>
           <a:r>
-            <a:rPr lang="de-DE" sz="3400" kern="1200" dirty="0"/>
+            <a:rPr lang="de-DE" sz="2800" kern="1200" dirty="0"/>
             <a:t>Parser (generated)</a:t>
           </a:r>
         </a:p>
@@ -6551,12 +6616,12 @@
         </a:fontRef>
       </dsp:style>
       <dsp:txBody>
-        <a:bodyPr spcFirstLastPara="0" vert="horz" wrap="square" lIns="129540" tIns="129540" rIns="129540" bIns="129540" numCol="1" spcCol="1270" anchor="ctr" anchorCtr="0">
+        <a:bodyPr spcFirstLastPara="0" vert="horz" wrap="square" lIns="106680" tIns="106680" rIns="106680" bIns="106680" numCol="1" spcCol="1270" anchor="ctr" anchorCtr="0">
           <a:noAutofit/>
         </a:bodyPr>
         <a:lstStyle/>
         <a:p>
-          <a:pPr marL="0" lvl="0" indent="0" algn="ctr" defTabSz="1511300">
+          <a:pPr marL="0" lvl="0" indent="0" algn="ctr" defTabSz="1244600">
             <a:lnSpc>
               <a:spcPct val="90000"/>
             </a:lnSpc>
@@ -6569,7 +6634,7 @@
             <a:buNone/>
           </a:pPr>
           <a:r>
-            <a:rPr lang="de-DE" sz="3400" kern="1200" dirty="0"/>
+            <a:rPr lang="de-DE" sz="2800" kern="1200" dirty="0"/>
             <a:t>Static Interfaces</a:t>
           </a:r>
         </a:p>
@@ -6629,12 +6694,12 @@
         </a:fontRef>
       </dsp:style>
       <dsp:txBody>
-        <a:bodyPr spcFirstLastPara="0" vert="horz" wrap="square" lIns="60960" tIns="60960" rIns="60960" bIns="60960" numCol="1" spcCol="1270" anchor="t" anchorCtr="0">
+        <a:bodyPr spcFirstLastPara="0" vert="horz" wrap="square" lIns="106680" tIns="106680" rIns="106680" bIns="106680" numCol="1" spcCol="1270" anchor="t" anchorCtr="0">
           <a:noAutofit/>
         </a:bodyPr>
         <a:lstStyle/>
         <a:p>
-          <a:pPr marL="0" lvl="0" indent="0" algn="ctr" defTabSz="1511300">
+          <a:pPr marL="0" lvl="0" indent="0" algn="ctr" defTabSz="1244600">
             <a:lnSpc>
               <a:spcPct val="90000"/>
             </a:lnSpc>
@@ -6646,8 +6711,11 @@
             </a:spcAft>
             <a:buNone/>
           </a:pPr>
+          <a:br>
+            <a:rPr lang="de-DE" sz="2800" kern="1200" dirty="0"/>
+          </a:br>
           <a:r>
-            <a:rPr lang="de-DE" sz="3400" kern="1200" dirty="0"/>
+            <a:rPr lang="de-DE" sz="2800" kern="1200" dirty="0"/>
             <a:t>Core Modules</a:t>
           </a:r>
         </a:p>
@@ -6665,8 +6733,31 @@
             <a:buChar char="•"/>
           </a:pPr>
           <a:r>
+            <a:rPr lang="de-DE" sz="1600" kern="1200" dirty="0" err="1"/>
+            <a:t>Preprocessor</a:t>
+          </a:r>
+          <a:endParaRPr lang="de-DE" sz="1600" kern="1200" dirty="0"/>
+        </a:p>
+        <a:p>
+          <a:pPr marL="171450" lvl="1" indent="-171450" algn="l" defTabSz="711200">
+            <a:lnSpc>
+              <a:spcPct val="90000"/>
+            </a:lnSpc>
+            <a:spcBef>
+              <a:spcPct val="0"/>
+            </a:spcBef>
+            <a:spcAft>
+              <a:spcPct val="15000"/>
+            </a:spcAft>
+            <a:buChar char="•"/>
+          </a:pPr>
+          <a:r>
+            <a:rPr lang="de-DE" sz="1600" kern="1200" dirty="0" err="1"/>
+            <a:t>Linked</a:t>
+          </a:r>
+          <a:r>
             <a:rPr lang="de-DE" sz="1600" kern="1200" dirty="0"/>
-            <a:t>Serializable Objects</a:t>
+            <a:t> Objects (Nodes)</a:t>
           </a:r>
         </a:p>
         <a:p>
@@ -13234,7 +13325,7 @@
           <a:p>
             <a:fld id="{DF53FDCC-A6EE-4065-95BC-3DAF8DE3D898}" type="datetimeFigureOut">
               <a:rPr lang="de-DE" smtClean="0"/>
-              <a:t>02.03.2023</a:t>
+              <a:t>07.01.2024</a:t>
             </a:fld>
             <a:endParaRPr lang="de-DE" dirty="0"/>
           </a:p>
@@ -13432,7 +13523,7 @@
           <a:p>
             <a:fld id="{DF53FDCC-A6EE-4065-95BC-3DAF8DE3D898}" type="datetimeFigureOut">
               <a:rPr lang="de-DE" smtClean="0"/>
-              <a:t>02.03.2023</a:t>
+              <a:t>07.01.2024</a:t>
             </a:fld>
             <a:endParaRPr lang="de-DE" dirty="0"/>
           </a:p>
@@ -13640,7 +13731,7 @@
           <a:p>
             <a:fld id="{DF53FDCC-A6EE-4065-95BC-3DAF8DE3D898}" type="datetimeFigureOut">
               <a:rPr lang="de-DE" smtClean="0"/>
-              <a:t>02.03.2023</a:t>
+              <a:t>07.01.2024</a:t>
             </a:fld>
             <a:endParaRPr lang="de-DE" dirty="0"/>
           </a:p>
@@ -13838,7 +13929,7 @@
           <a:p>
             <a:fld id="{DF53FDCC-A6EE-4065-95BC-3DAF8DE3D898}" type="datetimeFigureOut">
               <a:rPr lang="de-DE" smtClean="0"/>
-              <a:t>02.03.2023</a:t>
+              <a:t>07.01.2024</a:t>
             </a:fld>
             <a:endParaRPr lang="de-DE" dirty="0"/>
           </a:p>
@@ -14113,7 +14204,7 @@
           <a:p>
             <a:fld id="{DF53FDCC-A6EE-4065-95BC-3DAF8DE3D898}" type="datetimeFigureOut">
               <a:rPr lang="de-DE" smtClean="0"/>
-              <a:t>02.03.2023</a:t>
+              <a:t>07.01.2024</a:t>
             </a:fld>
             <a:endParaRPr lang="de-DE" dirty="0"/>
           </a:p>
@@ -14378,7 +14469,7 @@
           <a:p>
             <a:fld id="{DF53FDCC-A6EE-4065-95BC-3DAF8DE3D898}" type="datetimeFigureOut">
               <a:rPr lang="de-DE" smtClean="0"/>
-              <a:t>02.03.2023</a:t>
+              <a:t>07.01.2024</a:t>
             </a:fld>
             <a:endParaRPr lang="de-DE" dirty="0"/>
           </a:p>
@@ -14790,7 +14881,7 @@
           <a:p>
             <a:fld id="{DF53FDCC-A6EE-4065-95BC-3DAF8DE3D898}" type="datetimeFigureOut">
               <a:rPr lang="de-DE" smtClean="0"/>
-              <a:t>02.03.2023</a:t>
+              <a:t>07.01.2024</a:t>
             </a:fld>
             <a:endParaRPr lang="de-DE" dirty="0"/>
           </a:p>
@@ -14931,7 +15022,7 @@
           <a:p>
             <a:fld id="{DF53FDCC-A6EE-4065-95BC-3DAF8DE3D898}" type="datetimeFigureOut">
               <a:rPr lang="de-DE" smtClean="0"/>
-              <a:t>02.03.2023</a:t>
+              <a:t>07.01.2024</a:t>
             </a:fld>
             <a:endParaRPr lang="de-DE" dirty="0"/>
           </a:p>
@@ -15044,7 +15135,7 @@
           <a:p>
             <a:fld id="{DF53FDCC-A6EE-4065-95BC-3DAF8DE3D898}" type="datetimeFigureOut">
               <a:rPr lang="de-DE" smtClean="0"/>
-              <a:t>02.03.2023</a:t>
+              <a:t>07.01.2024</a:t>
             </a:fld>
             <a:endParaRPr lang="de-DE" dirty="0"/>
           </a:p>
@@ -15355,7 +15446,7 @@
           <a:p>
             <a:fld id="{DF53FDCC-A6EE-4065-95BC-3DAF8DE3D898}" type="datetimeFigureOut">
               <a:rPr lang="de-DE" smtClean="0"/>
-              <a:t>02.03.2023</a:t>
+              <a:t>07.01.2024</a:t>
             </a:fld>
             <a:endParaRPr lang="de-DE" dirty="0"/>
           </a:p>
@@ -15643,7 +15734,7 @@
           <a:p>
             <a:fld id="{DF53FDCC-A6EE-4065-95BC-3DAF8DE3D898}" type="datetimeFigureOut">
               <a:rPr lang="de-DE" smtClean="0"/>
-              <a:t>02.03.2023</a:t>
+              <a:t>07.01.2024</a:t>
             </a:fld>
             <a:endParaRPr lang="de-DE" dirty="0"/>
           </a:p>
@@ -15884,7 +15975,7 @@
           <a:p>
             <a:fld id="{DF53FDCC-A6EE-4065-95BC-3DAF8DE3D898}" type="datetimeFigureOut">
               <a:rPr lang="de-DE" smtClean="0"/>
-              <a:t>02.03.2023</a:t>
+              <a:t>07.01.2024</a:t>
             </a:fld>
             <a:endParaRPr lang="de-DE" dirty="0"/>
           </a:p>
@@ -16683,6 +16774,13 @@
             <a:schemeClr val="lt1"/>
           </a:fontRef>
         </p:style>
+        <p:txBody>
+          <a:bodyPr/>
+          <a:lstStyle/>
+          <a:p>
+            <a:endParaRPr lang="de-DE"/>
+          </a:p>
+        </p:txBody>
       </p:sp>
       <p:pic>
         <p:nvPicPr>
@@ -16779,6 +16877,13 @@
             <a:schemeClr val="lt1"/>
           </a:fontRef>
         </p:style>
+        <p:txBody>
+          <a:bodyPr/>
+          <a:lstStyle/>
+          <a:p>
+            <a:endParaRPr lang="de-DE"/>
+          </a:p>
+        </p:txBody>
       </p:sp>
       <p:cxnSp>
         <p:nvCxnSpPr>
@@ -16952,7 +17057,7 @@
           <p:nvPr>
             <p:extLst>
               <p:ext uri="{D42A27DB-BD31-4B8C-83A1-F6EECF244321}">
-                <p14:modId xmlns:p14="http://schemas.microsoft.com/office/powerpoint/2010/main" val="2158660121"/>
+                <p14:modId xmlns:p14="http://schemas.microsoft.com/office/powerpoint/2010/main" val="1590885092"/>
               </p:ext>
             </p:extLst>
           </p:nvPr>
@@ -17010,7 +17115,7 @@
           <p:nvPr>
             <p:extLst>
               <p:ext uri="{D42A27DB-BD31-4B8C-83A1-F6EECF244321}">
-                <p14:modId xmlns:p14="http://schemas.microsoft.com/office/powerpoint/2010/main" val="3829616861"/>
+                <p14:modId xmlns:p14="http://schemas.microsoft.com/office/powerpoint/2010/main" val="1392641700"/>
               </p:ext>
             </p:extLst>
           </p:nvPr>
@@ -17543,6 +17648,13 @@
             <a:schemeClr val="lt1"/>
           </a:fontRef>
         </p:style>
+        <p:txBody>
+          <a:bodyPr/>
+          <a:lstStyle/>
+          <a:p>
+            <a:endParaRPr lang="de-DE"/>
+          </a:p>
+        </p:txBody>
       </p:sp>
       <p:pic>
         <p:nvPicPr>
@@ -17639,6 +17751,13 @@
             <a:schemeClr val="lt1"/>
           </a:fontRef>
         </p:style>
+        <p:txBody>
+          <a:bodyPr/>
+          <a:lstStyle/>
+          <a:p>
+            <a:endParaRPr lang="de-DE"/>
+          </a:p>
+        </p:txBody>
       </p:sp>
       <p:cxnSp>
         <p:nvCxnSpPr>

</xml_diff>